<commit_message>
xss homework and demos
</commit_message>
<xml_diff>
--- a/week 2/week 2 - intermediate xss.pptx
+++ b/week 2/week 2 - intermediate xss.pptx
@@ -4969,10 +4969,122 @@
         </p:nvSpPr>
         <p:spPr/>
         <p:txBody>
-          <a:bodyPr/>
-          <a:lstStyle/>
-          <a:p>
-            <a:endParaRPr lang="en-US"/>
+          <a:bodyPr>
+            <a:normAutofit/>
+          </a:bodyPr>
+          <a:lstStyle/>
+          <a:p>
+            <a:r>
+              <a:rPr lang="en-US" sz="2000" dirty="0" smtClean="0">
+                <a:cs typeface="Consolas"/>
+              </a:rPr>
+              <a:t>XSS Auditor Bypass</a:t>
+            </a:r>
+          </a:p>
+          <a:p>
+            <a:pPr lvl="1"/>
+            <a:r>
+              <a:rPr lang="en-US" sz="1600" dirty="0" smtClean="0">
+                <a:latin typeface="Consolas"/>
+                <a:cs typeface="Consolas"/>
+              </a:rPr>
+              <a:t>&lt;</a:t>
+            </a:r>
+            <a:r>
+              <a:rPr lang="en-US" sz="1600" dirty="0">
+                <a:latin typeface="Consolas"/>
+                <a:cs typeface="Consolas"/>
+              </a:rPr>
+              <a:t>script</a:t>
+            </a:r>
+            <a:r>
+              <a:rPr lang="en-US" sz="1600" dirty="0" smtClean="0">
+                <a:latin typeface="Consolas"/>
+                <a:cs typeface="Consolas"/>
+              </a:rPr>
+              <a:t>&gt;</a:t>
+            </a:r>
+            <a:r>
+              <a:rPr lang="en-US" sz="1600" dirty="0">
+                <a:latin typeface="Consolas"/>
+                <a:cs typeface="Consolas"/>
+              </a:rPr>
+              <a:t>x</a:t>
+            </a:r>
+            <a:r>
+              <a:rPr lang="en-US" sz="1600" dirty="0" smtClean="0">
+                <a:latin typeface="Consolas"/>
+                <a:cs typeface="Consolas"/>
+              </a:rPr>
+              <a:t> </a:t>
+            </a:r>
+            <a:r>
+              <a:rPr lang="en-US" sz="1600" dirty="0">
+                <a:latin typeface="Consolas"/>
+                <a:cs typeface="Consolas"/>
+              </a:rPr>
+              <a:t>= "&lt;/script&gt;&lt;</a:t>
+            </a:r>
+            <a:r>
+              <a:rPr lang="en-US" sz="1600" dirty="0" err="1">
+                <a:latin typeface="Consolas"/>
+                <a:cs typeface="Consolas"/>
+              </a:rPr>
+              <a:t>svg</a:t>
+            </a:r>
+            <a:r>
+              <a:rPr lang="en-US" sz="1600" dirty="0">
+                <a:latin typeface="Consolas"/>
+                <a:cs typeface="Consolas"/>
+              </a:rPr>
+              <a:t>&gt;&lt;script&gt;alert(1)+&amp;</a:t>
+            </a:r>
+            <a:r>
+              <a:rPr lang="en-US" sz="1600" dirty="0" err="1">
+                <a:latin typeface="Consolas"/>
+                <a:cs typeface="Consolas"/>
+              </a:rPr>
+              <a:t>quot</a:t>
+            </a:r>
+            <a:r>
+              <a:rPr lang="en-US" sz="1600" dirty="0">
+                <a:latin typeface="Consolas"/>
+                <a:cs typeface="Consolas"/>
+              </a:rPr>
+              <a:t>;"</a:t>
+            </a:r>
+            <a:r>
+              <a:rPr lang="en-US" sz="1600" dirty="0" smtClean="0">
+                <a:latin typeface="Consolas"/>
+                <a:cs typeface="Consolas"/>
+              </a:rPr>
+              <a:t>;</a:t>
+            </a:r>
+          </a:p>
+          <a:p>
+            <a:r>
+              <a:rPr lang="en-US" sz="2000" dirty="0" smtClean="0">
+                <a:cs typeface="Consolas"/>
+              </a:rPr>
+              <a:t>XSS through SVG - demo</a:t>
+            </a:r>
+          </a:p>
+          <a:p>
+            <a:r>
+              <a:rPr lang="en-US" sz="2000" dirty="0" smtClean="0">
+                <a:cs typeface="Consolas"/>
+              </a:rPr>
+              <a:t>XSS through GIFs </a:t>
+            </a:r>
+            <a:r>
+              <a:rPr lang="en-US" sz="2000" smtClean="0">
+                <a:cs typeface="Consolas"/>
+              </a:rPr>
+              <a:t>- demo</a:t>
+            </a:r>
+            <a:endParaRPr lang="en-US" sz="2000" dirty="0">
+              <a:cs typeface="Consolas"/>
+            </a:endParaRPr>
           </a:p>
         </p:txBody>
       </p:sp>
@@ -5077,6 +5189,14 @@
                 <a:sym typeface="Wingdings"/>
               </a:rPr>
               <a:t>   e=</a:t>
+            </a:r>
+          </a:p>
+          <a:p>
+            <a:r>
+              <a:rPr lang="en-US" dirty="0" smtClean="0">
+                <a:sym typeface="Wingdings"/>
+              </a:rPr>
+              <a:t>If going through a restricted form change the size parameter in the tag</a:t>
             </a:r>
           </a:p>
           <a:p>

</xml_diff>

<commit_message>
adding week 3 puzzle and hw
</commit_message>
<xml_diff>
--- a/week 2/week 2 - intermediate xss.pptx
+++ b/week 2/week 2 - intermediate xss.pptx
@@ -297,7 +297,7 @@
           <a:p>
             <a:fld id="{23D59F71-1CB9-2744-95BD-AA5787AA0567}" type="datetimeFigureOut">
               <a:rPr lang="en-US" smtClean="0"/>
-              <a:t>4/9/15</a:t>
+              <a:t>4/15/15</a:t>
             </a:fld>
             <a:endParaRPr lang="en-US"/>
           </a:p>
@@ -467,7 +467,7 @@
           <a:p>
             <a:fld id="{23D59F71-1CB9-2744-95BD-AA5787AA0567}" type="datetimeFigureOut">
               <a:rPr lang="en-US" smtClean="0"/>
-              <a:t>4/9/15</a:t>
+              <a:t>4/15/15</a:t>
             </a:fld>
             <a:endParaRPr lang="en-US"/>
           </a:p>
@@ -647,7 +647,7 @@
           <a:p>
             <a:fld id="{23D59F71-1CB9-2744-95BD-AA5787AA0567}" type="datetimeFigureOut">
               <a:rPr lang="en-US" smtClean="0"/>
-              <a:t>4/9/15</a:t>
+              <a:t>4/15/15</a:t>
             </a:fld>
             <a:endParaRPr lang="en-US"/>
           </a:p>
@@ -817,7 +817,7 @@
           <a:p>
             <a:fld id="{23D59F71-1CB9-2744-95BD-AA5787AA0567}" type="datetimeFigureOut">
               <a:rPr lang="en-US" smtClean="0"/>
-              <a:t>4/9/15</a:t>
+              <a:t>4/15/15</a:t>
             </a:fld>
             <a:endParaRPr lang="en-US"/>
           </a:p>
@@ -1063,7 +1063,7 @@
           <a:p>
             <a:fld id="{23D59F71-1CB9-2744-95BD-AA5787AA0567}" type="datetimeFigureOut">
               <a:rPr lang="en-US" smtClean="0"/>
-              <a:t>4/9/15</a:t>
+              <a:t>4/15/15</a:t>
             </a:fld>
             <a:endParaRPr lang="en-US"/>
           </a:p>
@@ -1351,7 +1351,7 @@
           <a:p>
             <a:fld id="{23D59F71-1CB9-2744-95BD-AA5787AA0567}" type="datetimeFigureOut">
               <a:rPr lang="en-US" smtClean="0"/>
-              <a:t>4/9/15</a:t>
+              <a:t>4/15/15</a:t>
             </a:fld>
             <a:endParaRPr lang="en-US"/>
           </a:p>
@@ -1773,7 +1773,7 @@
           <a:p>
             <a:fld id="{23D59F71-1CB9-2744-95BD-AA5787AA0567}" type="datetimeFigureOut">
               <a:rPr lang="en-US" smtClean="0"/>
-              <a:t>4/9/15</a:t>
+              <a:t>4/15/15</a:t>
             </a:fld>
             <a:endParaRPr lang="en-US"/>
           </a:p>
@@ -1891,7 +1891,7 @@
           <a:p>
             <a:fld id="{23D59F71-1CB9-2744-95BD-AA5787AA0567}" type="datetimeFigureOut">
               <a:rPr lang="en-US" smtClean="0"/>
-              <a:t>4/9/15</a:t>
+              <a:t>4/15/15</a:t>
             </a:fld>
             <a:endParaRPr lang="en-US"/>
           </a:p>
@@ -1986,7 +1986,7 @@
           <a:p>
             <a:fld id="{23D59F71-1CB9-2744-95BD-AA5787AA0567}" type="datetimeFigureOut">
               <a:rPr lang="en-US" smtClean="0"/>
-              <a:t>4/9/15</a:t>
+              <a:t>4/15/15</a:t>
             </a:fld>
             <a:endParaRPr lang="en-US"/>
           </a:p>
@@ -2263,7 +2263,7 @@
           <a:p>
             <a:fld id="{23D59F71-1CB9-2744-95BD-AA5787AA0567}" type="datetimeFigureOut">
               <a:rPr lang="en-US" smtClean="0"/>
-              <a:t>4/9/15</a:t>
+              <a:t>4/15/15</a:t>
             </a:fld>
             <a:endParaRPr lang="en-US"/>
           </a:p>
@@ -2516,7 +2516,7 @@
           <a:p>
             <a:fld id="{23D59F71-1CB9-2744-95BD-AA5787AA0567}" type="datetimeFigureOut">
               <a:rPr lang="en-US" smtClean="0"/>
-              <a:t>4/9/15</a:t>
+              <a:t>4/15/15</a:t>
             </a:fld>
             <a:endParaRPr lang="en-US"/>
           </a:p>
@@ -2729,7 +2729,7 @@
           <a:p>
             <a:fld id="{23D59F71-1CB9-2744-95BD-AA5787AA0567}" type="datetimeFigureOut">
               <a:rPr lang="en-US" smtClean="0"/>
-              <a:t>4/9/15</a:t>
+              <a:t>4/15/15</a:t>
             </a:fld>
             <a:endParaRPr lang="en-US"/>
           </a:p>
@@ -3737,10 +3737,6 @@
               </a:rPr>
               <a:t>” alt=““&gt; &lt;script&gt;alert(0)&lt;/script&gt;</a:t>
             </a:r>
-            <a:endParaRPr lang="en-US" sz="1400" dirty="0" smtClean="0">
-              <a:latin typeface="Consolas"/>
-              <a:cs typeface="Consolas"/>
-            </a:endParaRPr>
           </a:p>
           <a:p>
             <a:r>
@@ -4442,20 +4438,21 @@
               <a:rPr lang="en-US" dirty="0" smtClean="0"/>
               <a:t>&gt; </a:t>
             </a:r>
+            <a:endParaRPr lang="en-US" dirty="0" smtClean="0"/>
+          </a:p>
+          <a:p>
+            <a:pPr lvl="1"/>
             <a:r>
               <a:rPr lang="en-US" dirty="0" smtClean="0">
                 <a:sym typeface="Wingdings"/>
               </a:rPr>
-              <a:t> domain will be different</a:t>
-            </a:r>
-          </a:p>
-          <a:p>
-            <a:pPr lvl="1"/>
+              <a:t>&lt;</a:t>
+            </a:r>
             <a:r>
               <a:rPr lang="en-US" dirty="0" smtClean="0">
                 <a:sym typeface="Wingdings"/>
               </a:rPr>
-              <a:t>&lt;body&gt;</a:t>
+              <a:t>body&gt;</a:t>
             </a:r>
             <a:endParaRPr lang="en-US" dirty="0" smtClean="0"/>
           </a:p>
@@ -4792,35 +4789,7 @@
             <a:pPr lvl="2"/>
             <a:r>
               <a:rPr lang="en-US" sz="2200" dirty="0" smtClean="0"/>
-              <a:t>\x</a:t>
-            </a:r>
-            <a:r>
-              <a:rPr lang="en-US" sz="2200" dirty="0" smtClean="0"/>
-              <a:t>[code point]  </a:t>
-            </a:r>
-            <a:r>
-              <a:rPr lang="en-US" sz="2200" dirty="0" smtClean="0"/>
-              <a:t>\u</a:t>
-            </a:r>
-            <a:r>
-              <a:rPr lang="en-US" sz="2200" dirty="0" smtClean="0"/>
-              <a:t>[code point]</a:t>
-            </a:r>
-            <a:r>
-              <a:rPr lang="en-US" sz="2200" dirty="0" smtClean="0"/>
-              <a:t>  %</a:t>
-            </a:r>
-            <a:r>
-              <a:rPr lang="en-US" sz="2200" dirty="0" smtClean="0"/>
-              <a:t>[code point]</a:t>
-            </a:r>
-            <a:r>
-              <a:rPr lang="en-US" sz="2200" dirty="0" smtClean="0"/>
-              <a:t>  &amp;#</a:t>
-            </a:r>
-            <a:r>
-              <a:rPr lang="en-US" sz="2200" dirty="0" smtClean="0"/>
-              <a:t>[code point]</a:t>
+              <a:t>\x[code point]  \u[code point]  %[code point]  &amp;#[code point]</a:t>
             </a:r>
           </a:p>
           <a:p>

</xml_diff>